<commit_message>
Add presentation to README.md
</commit_message>
<xml_diff>
--- a/documents/Presentation - Chemistry clash.pptx
+++ b/documents/Presentation - Chemistry clash.pptx
@@ -212,7 +212,7 @@
           <a:p>
             <a:fld id="{5CDD9887-4018-4CE9-92A7-33138C7EC0FB}" type="datetimeFigureOut">
               <a:rPr lang="en-US" smtClean="0"/>
-              <a:t>11/6/2023</a:t>
+              <a:t>11/7/2023</a:t>
             </a:fld>
             <a:endParaRPr lang="en-US"/>
           </a:p>
@@ -626,7 +626,7 @@
           <a:p>
             <a:fld id="{79398311-4AB7-4FB7-92A8-A52E1A8EF309}" type="datetimeFigureOut">
               <a:rPr lang="en-US" smtClean="0"/>
-              <a:t>11/6/2023</a:t>
+              <a:t>11/7/2023</a:t>
             </a:fld>
             <a:endParaRPr lang="en-US"/>
           </a:p>
@@ -824,7 +824,7 @@
           <a:p>
             <a:fld id="{79398311-4AB7-4FB7-92A8-A52E1A8EF309}" type="datetimeFigureOut">
               <a:rPr lang="en-US" smtClean="0"/>
-              <a:t>11/6/2023</a:t>
+              <a:t>11/7/2023</a:t>
             </a:fld>
             <a:endParaRPr lang="en-US"/>
           </a:p>
@@ -1032,7 +1032,7 @@
           <a:p>
             <a:fld id="{79398311-4AB7-4FB7-92A8-A52E1A8EF309}" type="datetimeFigureOut">
               <a:rPr lang="en-US" smtClean="0"/>
-              <a:t>11/6/2023</a:t>
+              <a:t>11/7/2023</a:t>
             </a:fld>
             <a:endParaRPr lang="en-US"/>
           </a:p>
@@ -1230,7 +1230,7 @@
           <a:p>
             <a:fld id="{79398311-4AB7-4FB7-92A8-A52E1A8EF309}" type="datetimeFigureOut">
               <a:rPr lang="en-US" smtClean="0"/>
-              <a:t>11/6/2023</a:t>
+              <a:t>11/7/2023</a:t>
             </a:fld>
             <a:endParaRPr lang="en-US"/>
           </a:p>
@@ -1505,7 +1505,7 @@
           <a:p>
             <a:fld id="{79398311-4AB7-4FB7-92A8-A52E1A8EF309}" type="datetimeFigureOut">
               <a:rPr lang="en-US" smtClean="0"/>
-              <a:t>11/6/2023</a:t>
+              <a:t>11/7/2023</a:t>
             </a:fld>
             <a:endParaRPr lang="en-US"/>
           </a:p>
@@ -1770,7 +1770,7 @@
           <a:p>
             <a:fld id="{79398311-4AB7-4FB7-92A8-A52E1A8EF309}" type="datetimeFigureOut">
               <a:rPr lang="en-US" smtClean="0"/>
-              <a:t>11/6/2023</a:t>
+              <a:t>11/7/2023</a:t>
             </a:fld>
             <a:endParaRPr lang="en-US"/>
           </a:p>
@@ -2182,7 +2182,7 @@
           <a:p>
             <a:fld id="{79398311-4AB7-4FB7-92A8-A52E1A8EF309}" type="datetimeFigureOut">
               <a:rPr lang="en-US" smtClean="0"/>
-              <a:t>11/6/2023</a:t>
+              <a:t>11/7/2023</a:t>
             </a:fld>
             <a:endParaRPr lang="en-US"/>
           </a:p>
@@ -2323,7 +2323,7 @@
           <a:p>
             <a:fld id="{79398311-4AB7-4FB7-92A8-A52E1A8EF309}" type="datetimeFigureOut">
               <a:rPr lang="en-US" smtClean="0"/>
-              <a:t>11/6/2023</a:t>
+              <a:t>11/7/2023</a:t>
             </a:fld>
             <a:endParaRPr lang="en-US"/>
           </a:p>
@@ -2436,7 +2436,7 @@
           <a:p>
             <a:fld id="{79398311-4AB7-4FB7-92A8-A52E1A8EF309}" type="datetimeFigureOut">
               <a:rPr lang="en-US" smtClean="0"/>
-              <a:t>11/6/2023</a:t>
+              <a:t>11/7/2023</a:t>
             </a:fld>
             <a:endParaRPr lang="en-US"/>
           </a:p>
@@ -2747,7 +2747,7 @@
           <a:p>
             <a:fld id="{79398311-4AB7-4FB7-92A8-A52E1A8EF309}" type="datetimeFigureOut">
               <a:rPr lang="en-US" smtClean="0"/>
-              <a:t>11/6/2023</a:t>
+              <a:t>11/7/2023</a:t>
             </a:fld>
             <a:endParaRPr lang="en-US"/>
           </a:p>
@@ -3035,7 +3035,7 @@
           <a:p>
             <a:fld id="{79398311-4AB7-4FB7-92A8-A52E1A8EF309}" type="datetimeFigureOut">
               <a:rPr lang="en-US" smtClean="0"/>
-              <a:t>11/6/2023</a:t>
+              <a:t>11/7/2023</a:t>
             </a:fld>
             <a:endParaRPr lang="en-US"/>
           </a:p>
@@ -3276,7 +3276,7 @@
           <a:p>
             <a:fld id="{79398311-4AB7-4FB7-92A8-A52E1A8EF309}" type="datetimeFigureOut">
               <a:rPr lang="en-US" smtClean="0"/>
-              <a:t>11/6/2023</a:t>
+              <a:t>11/7/2023</a:t>
             </a:fld>
             <a:endParaRPr lang="en-US"/>
           </a:p>
@@ -5112,8 +5112,8 @@
         </p:blipFill>
         <p:spPr>
           <a:xfrm>
-            <a:off x="3595008" y="714897"/>
-            <a:ext cx="5001983" cy="5001983"/>
+            <a:off x="4096334" y="965713"/>
+            <a:ext cx="3999332" cy="3999332"/>
           </a:xfrm>
           <a:prstGeom prst="rect">
             <a:avLst/>
@@ -9760,9 +9760,9 @@
         <p:grpSpPr>
           <a:xfrm>
             <a:off x="-1076330" y="861601"/>
-            <a:ext cx="2051555" cy="884583"/>
+            <a:ext cx="2088932" cy="884583"/>
             <a:chOff x="755167" y="905798"/>
-            <a:chExt cx="2051555" cy="884583"/>
+            <a:chExt cx="2088932" cy="884583"/>
           </a:xfrm>
         </p:grpSpPr>
         <p:sp>
@@ -9851,7 +9851,7 @@
           </p:blipFill>
           <p:spPr>
             <a:xfrm>
-              <a:off x="2033942" y="917952"/>
+              <a:off x="2071319" y="965578"/>
               <a:ext cx="772780" cy="765022"/>
             </a:xfrm>
             <a:prstGeom prst="rect">
@@ -13489,18 +13489,18 @@
 </file>
 
 <file path=customXml/item2.xml><?xml version="1.0" encoding="utf-8"?>
-<p:properties xmlns:p="http://schemas.microsoft.com/office/2006/metadata/properties" xmlns:xsi="http://www.w3.org/2001/XMLSchema-instance" xmlns:pc="http://schemas.microsoft.com/office/infopath/2007/PartnerControls">
-  <documentManagement/>
-</p:properties>
-</file>
-
-<file path=customXml/item3.xml><?xml version="1.0" encoding="utf-8"?>
 <?mso-contentType ?>
 <FormTemplates xmlns="http://schemas.microsoft.com/sharepoint/v3/contenttype/forms">
   <Display>DocumentLibraryForm</Display>
   <Edit>DocumentLibraryForm</Edit>
   <New>DocumentLibraryForm</New>
 </FormTemplates>
+</file>
+
+<file path=customXml/item3.xml><?xml version="1.0" encoding="utf-8"?>
+<p:properties xmlns:p="http://schemas.microsoft.com/office/2006/metadata/properties" xmlns:xsi="http://www.w3.org/2001/XMLSchema-instance" xmlns:pc="http://schemas.microsoft.com/office/infopath/2007/PartnerControls">
+  <documentManagement/>
+</p:properties>
 </file>
 
 <file path=customXml/itemProps1.xml><?xml version="1.0" encoding="utf-8"?>
@@ -13523,6 +13523,14 @@
 </file>
 
 <file path=customXml/itemProps2.xml><?xml version="1.0" encoding="utf-8"?>
+<ds:datastoreItem xmlns:ds="http://schemas.openxmlformats.org/officeDocument/2006/customXml" ds:itemID="{0F8E85DB-CC93-42B5-B825-76D9AB0141F6}">
+  <ds:schemaRefs>
+    <ds:schemaRef ds:uri="http://schemas.microsoft.com/sharepoint/v3/contenttype/forms"/>
+  </ds:schemaRefs>
+</ds:datastoreItem>
+</file>
+
+<file path=customXml/itemProps3.xml><?xml version="1.0" encoding="utf-8"?>
 <ds:datastoreItem xmlns:ds="http://schemas.openxmlformats.org/officeDocument/2006/customXml" ds:itemID="{AF7C0069-64A7-47EC-A2D7-753BF1FD2584}">
   <ds:schemaRefs>
     <ds:schemaRef ds:uri="81b0186a-5304-4fc4-b7ba-08fd66ef1995"/>
@@ -13537,12 +13545,4 @@
     <ds:schemaRef ds:uri="c2ea8659-bc04-4a8d-85a8-e3c83ebd3738"/>
   </ds:schemaRefs>
 </ds:datastoreItem>
-</file>
-
-<file path=customXml/itemProps3.xml><?xml version="1.0" encoding="utf-8"?>
-<ds:datastoreItem xmlns:ds="http://schemas.openxmlformats.org/officeDocument/2006/customXml" ds:itemID="{0F8E85DB-CC93-42B5-B825-76D9AB0141F6}">
-  <ds:schemaRefs>
-    <ds:schemaRef ds:uri="http://schemas.microsoft.com/sharepoint/v3/contenttype/forms"/>
-  </ds:schemaRefs>
-</ds:datastoreItem>
 </file>
</xml_diff>